<commit_message>
modified ./1.../README.pptx to reflect naming
</commit_message>
<xml_diff>
--- a/1 Getting Started/README.pptx
+++ b/1 Getting Started/README.pptx
@@ -4130,41 +4130,19 @@
           <a:p>
             <a:r>
               <a:rPr lang="en-US" dirty="0"/>
-              <a:t>To proceed to the next section double click on “Chapter_2.md” and then click the following icon in the top right of your screen to preview it</a:t>
-            </a:r>
-          </a:p>
-        </p:txBody>
-      </p:sp>
-      <p:pic>
-        <p:nvPicPr>
-          <p:cNvPr id="7" name="Picture 6">
-            <a:extLst>
-              <a:ext uri="{FF2B5EF4-FFF2-40B4-BE49-F238E27FC236}">
-                <a16:creationId xmlns:a16="http://schemas.microsoft.com/office/drawing/2014/main" id="{AF25E59D-2B82-FF45-9A8F-82BD8AC00FF8}"/>
-              </a:ext>
-            </a:extLst>
-          </p:cNvPr>
-          <p:cNvPicPr>
-            <a:picLocks noChangeAspect="1"/>
-          </p:cNvPicPr>
-          <p:nvPr/>
-        </p:nvPicPr>
-        <p:blipFill>
-          <a:blip r:embed="rId2"/>
-          <a:stretch>
-            <a:fillRect/>
-          </a:stretch>
-        </p:blipFill>
-        <p:spPr>
-          <a:xfrm>
-            <a:off x="8148966" y="1825625"/>
-            <a:ext cx="3204834" cy="2487149"/>
-          </a:xfrm>
-          <a:prstGeom prst="rect">
-            <a:avLst/>
-          </a:prstGeom>
-        </p:spPr>
-      </p:pic>
+              <a:t>To proceed to the next section double click on “2 </a:t>
+            </a:r>
+            <a:r>
+              <a:rPr lang="en-US" dirty="0" err="1"/>
+              <a:t>VSCode</a:t>
+            </a:r>
+            <a:r>
+              <a:rPr lang="en-US" dirty="0"/>
+              <a:t>/README.md” and then click the following icon in the top right of your screen to preview it</a:t>
+            </a:r>
+          </a:p>
+        </p:txBody>
+      </p:sp>
       <p:cxnSp>
         <p:nvCxnSpPr>
           <p:cNvPr id="8" name="Straight Arrow Connector 7">
@@ -4181,8 +4159,8 @@
         </p:nvCxnSpPr>
         <p:spPr>
           <a:xfrm flipV="1">
-            <a:off x="5438274" y="1979195"/>
-            <a:ext cx="2710692" cy="391026"/>
+            <a:off x="5438274" y="1675886"/>
+            <a:ext cx="2911400" cy="694335"/>
           </a:xfrm>
           <a:prstGeom prst="straightConnector1">
             <a:avLst/>
@@ -4220,14 +4198,13 @@
           </p:cNvPr>
           <p:cNvCxnSpPr>
             <a:cxnSpLocks/>
-            <a:endCxn id="7" idx="1"/>
           </p:cNvCxnSpPr>
           <p:nvPr/>
         </p:nvCxnSpPr>
         <p:spPr>
           <a:xfrm flipV="1">
-            <a:off x="6755732" y="3069200"/>
-            <a:ext cx="1393234" cy="1647179"/>
+            <a:off x="6755732" y="2695800"/>
+            <a:ext cx="1540042" cy="2020579"/>
           </a:xfrm>
           <a:prstGeom prst="straightConnector1">
             <a:avLst/>
@@ -4269,7 +4246,7 @@
           <p:nvPr/>
         </p:nvPicPr>
         <p:blipFill>
-          <a:blip r:embed="rId3"/>
+          <a:blip r:embed="rId2"/>
           <a:stretch>
             <a:fillRect/>
           </a:stretch>
@@ -4329,6 +4306,36 @@
           </a:fontRef>
         </p:style>
       </p:cxnSp>
+      <p:pic>
+        <p:nvPicPr>
+          <p:cNvPr id="5" name="Picture 4">
+            <a:extLst>
+              <a:ext uri="{FF2B5EF4-FFF2-40B4-BE49-F238E27FC236}">
+                <a16:creationId xmlns:a16="http://schemas.microsoft.com/office/drawing/2014/main" id="{5C4E2AA5-B0D1-F71E-69FB-578DDA9B8946}"/>
+              </a:ext>
+            </a:extLst>
+          </p:cNvPr>
+          <p:cNvPicPr>
+            <a:picLocks noChangeAspect="1"/>
+          </p:cNvPicPr>
+          <p:nvPr/>
+        </p:nvPicPr>
+        <p:blipFill>
+          <a:blip r:embed="rId3"/>
+          <a:stretch>
+            <a:fillRect/>
+          </a:stretch>
+        </p:blipFill>
+        <p:spPr>
+          <a:xfrm>
+            <a:off x="8349674" y="1480513"/>
+            <a:ext cx="3668707" cy="2592175"/>
+          </a:xfrm>
+          <a:prstGeom prst="rect">
+            <a:avLst/>
+          </a:prstGeom>
+        </p:spPr>
+      </p:pic>
     </p:spTree>
     <p:extLst>
       <p:ext uri="{BB962C8B-B14F-4D97-AF65-F5344CB8AC3E}">

</xml_diff>